<commit_message>
added # SPDX-License-Identifier: Apache-2.0  to all files
</commit_message>
<xml_diff>
--- a/Documentation/Polycephaly-OpenMainframeProject.pptx
+++ b/Documentation/Polycephaly-OpenMainframeProject.pptx
@@ -310,7 +310,7 @@
             <a:fld id="{B61BEF0D-F0BB-DE4B-95CE-6DB70DBA9567}" type="datetimeFigureOut">
               <a:rPr lang="en-US" dirty="0"/>
               <a:pPr/>
-              <a:t>5/9/2019</a:t>
+              <a:t>11/4/2020</a:t>
             </a:fld>
             <a:endParaRPr lang="en-US" dirty="0"/>
           </a:p>
@@ -645,7 +645,7 @@
             <a:fld id="{B61BEF0D-F0BB-DE4B-95CE-6DB70DBA9567}" type="datetimeFigureOut">
               <a:rPr lang="en-US" dirty="0"/>
               <a:pPr/>
-              <a:t>5/9/2019</a:t>
+              <a:t>11/4/2020</a:t>
             </a:fld>
             <a:endParaRPr lang="en-US" dirty="0"/>
           </a:p>
@@ -1043,7 +1043,7 @@
             <a:fld id="{B61BEF0D-F0BB-DE4B-95CE-6DB70DBA9567}" type="datetimeFigureOut">
               <a:rPr lang="en-US" dirty="0"/>
               <a:pPr/>
-              <a:t>5/9/2019</a:t>
+              <a:t>11/4/2020</a:t>
             </a:fld>
             <a:endParaRPr lang="en-US" dirty="0"/>
           </a:p>
@@ -1376,7 +1376,7 @@
             <a:fld id="{B61BEF0D-F0BB-DE4B-95CE-6DB70DBA9567}" type="datetimeFigureOut">
               <a:rPr lang="en-US" dirty="0"/>
               <a:pPr/>
-              <a:t>5/9/2019</a:t>
+              <a:t>11/4/2020</a:t>
             </a:fld>
             <a:endParaRPr lang="en-US" dirty="0"/>
           </a:p>
@@ -1693,7 +1693,7 @@
             <a:fld id="{B61BEF0D-F0BB-DE4B-95CE-6DB70DBA9567}" type="datetimeFigureOut">
               <a:rPr lang="en-US" dirty="0"/>
               <a:pPr/>
-              <a:t>5/9/2019</a:t>
+              <a:t>11/4/2020</a:t>
             </a:fld>
             <a:endParaRPr lang="en-US" dirty="0"/>
           </a:p>
@@ -2086,7 +2086,7 @@
             <a:fld id="{B61BEF0D-F0BB-DE4B-95CE-6DB70DBA9567}" type="datetimeFigureOut">
               <a:rPr lang="en-US" dirty="0"/>
               <a:pPr/>
-              <a:t>5/9/2019</a:t>
+              <a:t>11/4/2020</a:t>
             </a:fld>
             <a:endParaRPr lang="en-US" dirty="0"/>
           </a:p>
@@ -2340,7 +2340,7 @@
             <a:fld id="{B61BEF0D-F0BB-DE4B-95CE-6DB70DBA9567}" type="datetimeFigureOut">
               <a:rPr lang="en-US" dirty="0"/>
               <a:pPr/>
-              <a:t>5/9/2019</a:t>
+              <a:t>11/4/2020</a:t>
             </a:fld>
             <a:endParaRPr lang="en-US" dirty="0"/>
           </a:p>
@@ -2599,7 +2599,7 @@
             <a:fld id="{B61BEF0D-F0BB-DE4B-95CE-6DB70DBA9567}" type="datetimeFigureOut">
               <a:rPr lang="en-US" dirty="0"/>
               <a:pPr/>
-              <a:t>5/9/2019</a:t>
+              <a:t>11/4/2020</a:t>
             </a:fld>
             <a:endParaRPr lang="en-US" dirty="0"/>
           </a:p>
@@ -2858,7 +2858,7 @@
             <a:fld id="{B61BEF0D-F0BB-DE4B-95CE-6DB70DBA9567}" type="datetimeFigureOut">
               <a:rPr lang="en-US" dirty="0"/>
               <a:pPr/>
-              <a:t>5/9/2019</a:t>
+              <a:t>11/4/2020</a:t>
             </a:fld>
             <a:endParaRPr lang="en-US" dirty="0"/>
           </a:p>
@@ -3184,7 +3184,7 @@
             <a:fld id="{B61BEF0D-F0BB-DE4B-95CE-6DB70DBA9567}" type="datetimeFigureOut">
               <a:rPr lang="en-US" dirty="0"/>
               <a:pPr/>
-              <a:t>5/9/2019</a:t>
+              <a:t>11/4/2020</a:t>
             </a:fld>
             <a:endParaRPr lang="en-US" dirty="0"/>
           </a:p>
@@ -3504,7 +3504,7 @@
             <a:fld id="{B61BEF0D-F0BB-DE4B-95CE-6DB70DBA9567}" type="datetimeFigureOut">
               <a:rPr lang="en-US" dirty="0"/>
               <a:pPr/>
-              <a:t>5/9/2019</a:t>
+              <a:t>11/4/2020</a:t>
             </a:fld>
             <a:endParaRPr lang="en-US" dirty="0"/>
           </a:p>
@@ -3958,7 +3958,7 @@
             <a:fld id="{B61BEF0D-F0BB-DE4B-95CE-6DB70DBA9567}" type="datetimeFigureOut">
               <a:rPr lang="en-US" dirty="0"/>
               <a:pPr/>
-              <a:t>5/9/2019</a:t>
+              <a:t>11/4/2020</a:t>
             </a:fld>
             <a:endParaRPr lang="en-US" dirty="0"/>
           </a:p>
@@ -4160,7 +4160,7 @@
             <a:fld id="{B61BEF0D-F0BB-DE4B-95CE-6DB70DBA9567}" type="datetimeFigureOut">
               <a:rPr lang="en-US" dirty="0"/>
               <a:pPr/>
-              <a:t>5/9/2019</a:t>
+              <a:t>11/4/2020</a:t>
             </a:fld>
             <a:endParaRPr lang="en-US" dirty="0"/>
           </a:p>
@@ -4334,7 +4334,7 @@
             <a:fld id="{B61BEF0D-F0BB-DE4B-95CE-6DB70DBA9567}" type="datetimeFigureOut">
               <a:rPr lang="en-US" dirty="0"/>
               <a:pPr/>
-              <a:t>5/9/2019</a:t>
+              <a:t>11/4/2020</a:t>
             </a:fld>
             <a:endParaRPr lang="en-US" dirty="0"/>
           </a:p>
@@ -4664,7 +4664,7 @@
             <a:fld id="{B61BEF0D-F0BB-DE4B-95CE-6DB70DBA9567}" type="datetimeFigureOut">
               <a:rPr lang="en-US" dirty="0"/>
               <a:pPr/>
-              <a:t>5/9/2019</a:t>
+              <a:t>11/4/2020</a:t>
             </a:fld>
             <a:endParaRPr lang="en-US" dirty="0"/>
           </a:p>
@@ -5006,7 +5006,7 @@
             <a:fld id="{B61BEF0D-F0BB-DE4B-95CE-6DB70DBA9567}" type="datetimeFigureOut">
               <a:rPr lang="en-US" dirty="0"/>
               <a:pPr/>
-              <a:t>5/9/2019</a:t>
+              <a:t>11/4/2020</a:t>
             </a:fld>
             <a:endParaRPr lang="en-US" dirty="0"/>
           </a:p>
@@ -7120,7 +7120,7 @@
             <a:fld id="{B61BEF0D-F0BB-DE4B-95CE-6DB70DBA9567}" type="datetimeFigureOut">
               <a:rPr lang="en-US" dirty="0"/>
               <a:pPr/>
-              <a:t>5/9/2019</a:t>
+              <a:t>11/4/2020</a:t>
             </a:fld>
             <a:endParaRPr lang="en-US" dirty="0"/>
           </a:p>
@@ -7657,6 +7657,42 @@
           </a:p>
         </p:txBody>
       </p:sp>
+      <p:sp>
+        <p:nvSpPr>
+          <p:cNvPr id="3" name="TextBox 2"/>
+          <p:cNvSpPr txBox="1"/>
+          <p:nvPr/>
+        </p:nvSpPr>
+        <p:spPr>
+          <a:xfrm>
+            <a:off x="9218815" y="6533804"/>
+            <a:ext cx="2701636" cy="215444"/>
+          </a:xfrm>
+          <a:prstGeom prst="rect">
+            <a:avLst/>
+          </a:prstGeom>
+          <a:noFill/>
+        </p:spPr>
+        <p:txBody>
+          <a:bodyPr wrap="square" rtlCol="0">
+            <a:spAutoFit/>
+          </a:bodyPr>
+          <a:lstStyle/>
+          <a:p>
+            <a:r>
+              <a:rPr lang="en-US" sz="800" dirty="0">
+                <a:latin typeface="Arial" panose="020B0604020202020204" pitchFamily="34" charset="0"/>
+                <a:cs typeface="Arial" panose="020B0604020202020204" pitchFamily="34" charset="0"/>
+              </a:rPr>
+              <a:t># SPDX-License-Identifier: Apache-2.0 </a:t>
+            </a:r>
+            <a:endParaRPr lang="en-US" sz="800" dirty="0">
+              <a:latin typeface="Arial" panose="020B0604020202020204" pitchFamily="34" charset="0"/>
+              <a:cs typeface="Arial" panose="020B0604020202020204" pitchFamily="34" charset="0"/>
+            </a:endParaRPr>
+          </a:p>
+        </p:txBody>
+      </p:sp>
     </p:spTree>
     <p:extLst>
       <p:ext uri="{BB962C8B-B14F-4D97-AF65-F5344CB8AC3E}">
@@ -7726,15 +7762,7 @@
             </a:br>
             <a:r>
               <a:rPr lang="en-US" dirty="0" smtClean="0"/>
-              <a:t>Full Application build for </a:t>
-            </a:r>
-            <a:r>
-              <a:rPr lang="en-US" dirty="0" smtClean="0"/>
-              <a:t>z/OS App</a:t>
-            </a:r>
-            <a:r>
-              <a:rPr lang="en-US" dirty="0" smtClean="0"/>
-              <a:t/>
+              <a:t>Full Application build for z/OS App</a:t>
             </a:r>
             <a:br>
               <a:rPr lang="en-US" dirty="0" smtClean="0"/>
@@ -7894,7 +7922,6 @@
               <a:rPr lang="en-US" dirty="0" smtClean="0"/>
               <a:t>~330,000 lines of code, including the Copybooks</a:t>
             </a:r>
-            <a:endParaRPr lang="en-US" dirty="0" smtClean="0"/>
           </a:p>
         </p:txBody>
       </p:sp>
@@ -8105,19 +8132,7 @@
           <a:p>
             <a:r>
               <a:rPr lang="en-US" dirty="0" smtClean="0"/>
-              <a:t>Correct issues between </a:t>
-            </a:r>
-            <a:r>
-              <a:rPr lang="en-US" dirty="0" smtClean="0"/>
-              <a:t>z/OS SCM </a:t>
-            </a:r>
-            <a:r>
-              <a:rPr lang="en-US" dirty="0" smtClean="0"/>
-              <a:t>and </a:t>
-            </a:r>
-            <a:r>
-              <a:rPr lang="en-US" dirty="0" smtClean="0"/>
-              <a:t>ADDI</a:t>
+              <a:t>Correct issues between z/OS SCM and ADDI</a:t>
             </a:r>
           </a:p>
           <a:p>
@@ -8302,15 +8317,7 @@
             </a:r>
             <a:r>
               <a:rPr lang="en-US" dirty="0" smtClean="0"/>
-              <a:t>, Ant, Groovy and </a:t>
-            </a:r>
-            <a:r>
-              <a:rPr lang="en-US" dirty="0" smtClean="0"/>
-              <a:t>DBB </a:t>
-            </a:r>
-            <a:r>
-              <a:rPr lang="en-US" dirty="0" smtClean="0"/>
-              <a:t>installed on z/OS</a:t>
+              <a:t>, Ant, Groovy and DBB installed on z/OS</a:t>
             </a:r>
           </a:p>
           <a:p>
@@ -8538,11 +8545,7 @@
           <a:p>
             <a:r>
               <a:rPr lang="en-US" dirty="0" smtClean="0"/>
-              <a:t>Automated </a:t>
-            </a:r>
-            <a:r>
-              <a:rPr lang="en-US" dirty="0" smtClean="0"/>
-              <a:t>test cases, including z/OS batch job test cases with results</a:t>
+              <a:t>Automated test cases, including z/OS batch job test cases with results</a:t>
             </a:r>
           </a:p>
           <a:p>
@@ -8560,7 +8563,6 @@
               <a:rPr lang="en-US" dirty="0" smtClean="0"/>
               <a:t> z/OS support using IP connectivity and Jenkins Slave</a:t>
             </a:r>
-            <a:endParaRPr lang="en-US" dirty="0" smtClean="0"/>
           </a:p>
           <a:p>
             <a:r>
@@ -8579,21 +8581,13 @@
           <a:p>
             <a:r>
               <a:rPr lang="en-US" dirty="0" smtClean="0"/>
-              <a:t>1000+ </a:t>
-            </a:r>
-            <a:r>
-              <a:rPr lang="en-US" dirty="0" smtClean="0"/>
-              <a:t>plugins</a:t>
-            </a:r>
-          </a:p>
-          <a:p>
-            <a:r>
-              <a:rPr lang="en-US" dirty="0" smtClean="0"/>
-              <a:t>CICS </a:t>
-            </a:r>
-            <a:r>
-              <a:rPr lang="en-US" dirty="0" smtClean="0"/>
-              <a:t>configurations, as source code and part of the application</a:t>
+              <a:t>1000+ plugins</a:t>
+            </a:r>
+          </a:p>
+          <a:p>
+            <a:r>
+              <a:rPr lang="en-US" dirty="0" smtClean="0"/>
+              <a:t>CICS configurations, as source code and part of the application</a:t>
             </a:r>
           </a:p>
           <a:p>
@@ -8959,7 +8953,6 @@
               <a:rPr lang="en-US" dirty="0" smtClean="0"/>
               <a:t>Built to separate z/OS from Jenkin’s Admin</a:t>
             </a:r>
-            <a:endParaRPr lang="en-US" dirty="0" smtClean="0"/>
           </a:p>
           <a:p>
             <a:r>
@@ -8978,7 +8971,6 @@
               <a:rPr lang="en-US" dirty="0" smtClean="0"/>
               <a:t>Currently, only setup to build and dev deploy</a:t>
             </a:r>
-            <a:endParaRPr lang="en-US" dirty="0" smtClean="0"/>
           </a:p>
           <a:p>
             <a:endParaRPr lang="en-US" dirty="0" smtClean="0"/>

</xml_diff>